<commit_message>
Changes to Presentation file
</commit_message>
<xml_diff>
--- a/presentation/Public_Policy_Presentation.pptx
+++ b/presentation/Public_Policy_Presentation.pptx
@@ -232,7 +232,7 @@
           <a:p>
             <a:fld id="{F68ABEA4-9216-4FDF-AAE1-D8632908A8EC}" type="datetimeFigureOut">
               <a:rPr lang="de-CH" smtClean="0"/>
-              <a:t>24.05.2025</a:t>
+              <a:t>29.05.2025</a:t>
             </a:fld>
             <a:endParaRPr lang="de-CH"/>
           </a:p>
@@ -409,7 +409,7 @@
           <a:p>
             <a:fld id="{4B78A90D-FE7E-41AF-B03D-808D82937CB9}" type="datetimeFigureOut">
               <a:rPr lang="de-CH" smtClean="0"/>
-              <a:t>24.05.2025</a:t>
+              <a:t>29.05.2025</a:t>
             </a:fld>
             <a:endParaRPr lang="de-CH"/>
           </a:p>
@@ -1166,7 +1166,7 @@
           <a:p>
             <a:fld id="{9C26206A-A7FF-4A2F-A4EA-EDA7D9956B8C}" type="datetime1">
               <a:rPr lang="de-CH" noProof="0" smtClean="0"/>
-              <a:t>24.05.2025</a:t>
+              <a:t>29.05.2025</a:t>
             </a:fld>
             <a:endParaRPr lang="de-CH" noProof="0"/>
           </a:p>
@@ -1361,7 +1361,7 @@
           <a:p>
             <a:fld id="{AE2B7ECC-AD5B-4AE2-A84F-7ABFC0424E38}" type="datetime1">
               <a:rPr lang="de-CH" noProof="0" smtClean="0"/>
-              <a:t>24.05.2025</a:t>
+              <a:t>29.05.2025</a:t>
             </a:fld>
             <a:endParaRPr lang="de-CH" noProof="0"/>
           </a:p>
@@ -1648,7 +1648,7 @@
           <a:p>
             <a:fld id="{5FA21818-B1F9-4DD3-88F2-43FBC3C9BAF5}" type="datetime1">
               <a:rPr lang="de-CH" noProof="0" smtClean="0"/>
-              <a:t>24.05.2025</a:t>
+              <a:t>29.05.2025</a:t>
             </a:fld>
             <a:endParaRPr lang="de-CH" noProof="0"/>
           </a:p>
@@ -1946,7 +1946,7 @@
           <a:p>
             <a:fld id="{F570A20D-9FD8-4251-A734-1127FF21ADB2}" type="datetime1">
               <a:rPr lang="de-CH" noProof="0" smtClean="0"/>
-              <a:t>24.05.2025</a:t>
+              <a:t>29.05.2025</a:t>
             </a:fld>
             <a:endParaRPr lang="de-CH" noProof="0"/>
           </a:p>
@@ -2346,7 +2346,7 @@
           <a:p>
             <a:fld id="{BB5F4EA9-B322-4AC6-9ED4-333F1AAC8416}" type="datetime1">
               <a:rPr lang="de-CH" noProof="0" smtClean="0"/>
-              <a:t>24.05.2025</a:t>
+              <a:t>29.05.2025</a:t>
             </a:fld>
             <a:endParaRPr lang="de-CH" noProof="0"/>
           </a:p>
@@ -2714,7 +2714,7 @@
           <a:p>
             <a:fld id="{CFD59B2A-9722-4479-8974-FDB801910172}" type="datetime1">
               <a:rPr lang="de-CH" noProof="0" smtClean="0"/>
-              <a:t>24.05.2025</a:t>
+              <a:t>29.05.2025</a:t>
             </a:fld>
             <a:endParaRPr lang="de-CH" noProof="0"/>
           </a:p>
@@ -4743,7 +4743,7 @@
           <a:p>
             <a:fld id="{6861D6AC-3BAC-4A50-9479-1E7CD895A648}" type="datetime1">
               <a:rPr lang="de-CH" noProof="0" smtClean="0"/>
-              <a:t>24.05.2025</a:t>
+              <a:t>29.05.2025</a:t>
             </a:fld>
             <a:endParaRPr lang="de-CH" noProof="0"/>
           </a:p>
@@ -4991,7 +4991,7 @@
           <a:p>
             <a:fld id="{360162FC-E8FF-4D52-8F53-8F2A2A3AD348}" type="datetime1">
               <a:rPr lang="de-CH" noProof="0" smtClean="0"/>
-              <a:t>24.05.2025</a:t>
+              <a:t>29.05.2025</a:t>
             </a:fld>
             <a:endParaRPr lang="de-CH" noProof="0"/>
           </a:p>
@@ -5239,7 +5239,7 @@
           <a:p>
             <a:fld id="{56D5A3C0-7A2F-4A62-9057-882FB8F5659A}" type="datetime1">
               <a:rPr lang="de-CH" noProof="0" smtClean="0"/>
-              <a:t>24.05.2025</a:t>
+              <a:t>29.05.2025</a:t>
             </a:fld>
             <a:endParaRPr lang="de-CH" noProof="0"/>
           </a:p>
@@ -5515,7 +5515,7 @@
           <a:p>
             <a:fld id="{73923CAD-8964-4A8E-9E9C-0F755B932903}" type="datetime1">
               <a:rPr lang="de-CH" noProof="0" smtClean="0"/>
-              <a:t>24.05.2025</a:t>
+              <a:t>29.05.2025</a:t>
             </a:fld>
             <a:endParaRPr lang="de-CH" noProof="0"/>
           </a:p>
@@ -7446,7 +7446,7 @@
           <a:p>
             <a:fld id="{269E37AB-EE9C-4565-B2FD-B1FC504BEE2A}" type="datetime1">
               <a:rPr lang="de-CH" noProof="0" smtClean="0"/>
-              <a:t>24.05.2025</a:t>
+              <a:t>29.05.2025</a:t>
             </a:fld>
             <a:endParaRPr lang="de-CH" noProof="0"/>
           </a:p>
@@ -8518,7 +8518,7 @@
           <a:p>
             <a:fld id="{298B387B-FBD3-42F8-9E31-B45335F65718}" type="datetime1">
               <a:rPr lang="de-CH" noProof="0" smtClean="0"/>
-              <a:t>24.05.2025</a:t>
+              <a:t>29.05.2025</a:t>
             </a:fld>
             <a:endParaRPr lang="de-CH" noProof="0"/>
           </a:p>
@@ -8954,7 +8954,7 @@
           <a:p>
             <a:fld id="{298B387B-FBD3-42F8-9E31-B45335F65718}" type="datetime1">
               <a:rPr lang="de-CH" noProof="0" smtClean="0"/>
-              <a:t>24.05.2025</a:t>
+              <a:t>29.05.2025</a:t>
             </a:fld>
             <a:endParaRPr lang="de-CH" noProof="0"/>
           </a:p>
@@ -9303,20 +9303,20 @@
               <a:buNone/>
             </a:pPr>
             <a:r>
-              <a:rPr lang="en-GB" sz="2000" b="1" dirty="0"/>
+              <a:rPr lang="en-GB" sz="1200" b="1" dirty="0"/>
               <a:t>Strategy</a:t>
             </a:r>
-            <a:endParaRPr lang="en-GB" b="1" dirty="0"/>
-          </a:p>
-          <a:p>
-            <a:endParaRPr lang="en-GB" dirty="0"/>
-          </a:p>
-          <a:p>
-            <a:r>
-              <a:rPr lang="en-GB" sz="1400" b="1" dirty="0"/>
-              <a:t>Topic Modelling with LDA:</a:t>
-            </a:r>
-            <a:endParaRPr lang="en-GB" sz="1400" dirty="0"/>
+            <a:endParaRPr lang="en-GB" sz="1100" b="1" dirty="0"/>
+          </a:p>
+          <a:p>
+            <a:endParaRPr lang="en-GB" sz="1100" dirty="0"/>
+          </a:p>
+          <a:p>
+            <a:r>
+              <a:rPr lang="en-GB" sz="1000" b="1" dirty="0"/>
+              <a:t>Pre-Processing of Corpus and Data Frame:</a:t>
+            </a:r>
+            <a:endParaRPr lang="en-GB" sz="1000" dirty="0"/>
           </a:p>
           <a:p>
             <a:pPr marL="742950" lvl="1" indent="-285750">
@@ -9324,7 +9324,7 @@
               <a:buChar char="•"/>
             </a:pPr>
             <a:r>
-              <a:rPr lang="en-GB" sz="1400" dirty="0"/>
+              <a:rPr lang="en-GB" sz="1000" dirty="0"/>
               <a:t>Summarising most important topics and themes</a:t>
             </a:r>
           </a:p>
@@ -9334,16 +9334,16 @@
               <a:buChar char="•"/>
             </a:pPr>
             <a:r>
-              <a:rPr lang="en-GB" sz="1400" dirty="0"/>
+              <a:rPr lang="en-GB" sz="1000" dirty="0"/>
               <a:t>Assign each document a score for each topic</a:t>
             </a:r>
           </a:p>
           <a:p>
             <a:r>
-              <a:rPr lang="en-GB" sz="1400" b="1" dirty="0"/>
-              <a:t>Predictive Modelling using Classification and BERT:</a:t>
-            </a:r>
-            <a:endParaRPr lang="en-GB" sz="1400" dirty="0"/>
+              <a:rPr lang="en-GB" sz="1000" b="1" dirty="0"/>
+              <a:t>NLP Processing:</a:t>
+            </a:r>
+            <a:endParaRPr lang="en-GB" sz="1000" dirty="0"/>
           </a:p>
           <a:p>
             <a:pPr marL="742950" lvl="1" indent="-285750">
@@ -9351,9 +9351,97 @@
               <a:buChar char="•"/>
             </a:pPr>
             <a:r>
-              <a:rPr lang="en-GB" sz="1400" dirty="0"/>
-              <a:t>Logistic regression predicts bill passage using topic proportions and state-level political/economic indicators</a:t>
-            </a:r>
+              <a:rPr lang="en-GB" sz="1000" dirty="0"/>
+              <a:t>Pre-processing </a:t>
+            </a:r>
+          </a:p>
+          <a:p>
+            <a:pPr marL="1014787" lvl="2" indent="-285750">
+              <a:buFont typeface="Arial" panose="020B0604020202020204" pitchFamily="34" charset="0"/>
+              <a:buChar char="•"/>
+            </a:pPr>
+            <a:r>
+              <a:rPr lang="en-GB" sz="1000" dirty="0"/>
+              <a:t>(Lower case / N-Grams/Compound Words / Capitalisation </a:t>
+            </a:r>
+            <a:r>
+              <a:rPr lang="en-GB" sz="1000" dirty="0" err="1"/>
+              <a:t>blablabla</a:t>
+            </a:r>
+            <a:r>
+              <a:rPr lang="en-GB" sz="1000" dirty="0"/>
+              <a:t>)</a:t>
+            </a:r>
+          </a:p>
+          <a:p>
+            <a:pPr marL="1014787" lvl="2" indent="-285750">
+              <a:buFont typeface="Arial" panose="020B0604020202020204" pitchFamily="34" charset="0"/>
+              <a:buChar char="•"/>
+            </a:pPr>
+            <a:r>
+              <a:rPr lang="en-GB" sz="1000" dirty="0"/>
+              <a:t>Tokenisation with NLTK (Bigrams </a:t>
+            </a:r>
+            <a:r>
+              <a:rPr lang="en-GB" sz="1000" dirty="0" err="1"/>
+              <a:t>phraser</a:t>
+            </a:r>
+            <a:r>
+              <a:rPr lang="en-GB" sz="1000" dirty="0"/>
+              <a:t> module from genism)</a:t>
+            </a:r>
+          </a:p>
+          <a:p>
+            <a:pPr marL="1014787" lvl="2" indent="-285750">
+              <a:buFont typeface="Arial" panose="020B0604020202020204" pitchFamily="34" charset="0"/>
+              <a:buChar char="•"/>
+            </a:pPr>
+            <a:r>
+              <a:rPr lang="en-GB" sz="1000" dirty="0"/>
+              <a:t>BERT </a:t>
+            </a:r>
+          </a:p>
+          <a:p>
+            <a:pPr marL="1284787" lvl="3" indent="-285750">
+              <a:buFont typeface="Arial" panose="020B0604020202020204" pitchFamily="34" charset="0"/>
+              <a:buChar char="•"/>
+            </a:pPr>
+            <a:r>
+              <a:rPr lang="en-GB" sz="1000" dirty="0"/>
+              <a:t>8 Models using </a:t>
+            </a:r>
+            <a:r>
+              <a:rPr lang="en-GB" sz="1000" dirty="0" err="1"/>
+              <a:t>BertTopic</a:t>
+            </a:r>
+            <a:endParaRPr lang="en-GB" sz="1000" dirty="0"/>
+          </a:p>
+          <a:p>
+            <a:pPr marL="1284787" lvl="3" indent="-285750">
+              <a:buFont typeface="Arial" panose="020B0604020202020204" pitchFamily="34" charset="0"/>
+              <a:buChar char="•"/>
+            </a:pPr>
+            <a:r>
+              <a:rPr lang="en-GB" sz="1000" dirty="0"/>
+              <a:t>Assign topic shares to each doc</a:t>
+            </a:r>
+          </a:p>
+          <a:p>
+            <a:pPr marL="1284787" lvl="3" indent="-285750">
+              <a:buFont typeface="Arial" panose="020B0604020202020204" pitchFamily="34" charset="0"/>
+              <a:buChar char="•"/>
+            </a:pPr>
+            <a:r>
+              <a:rPr lang="en-GB" sz="1000" dirty="0"/>
+              <a:t>Amend to DF</a:t>
+            </a:r>
+          </a:p>
+          <a:p>
+            <a:r>
+              <a:rPr lang="en-GB" sz="1000" b="1" dirty="0"/>
+              <a:t>Regression:</a:t>
+            </a:r>
+            <a:endParaRPr lang="en-GB" sz="1000" dirty="0"/>
           </a:p>
           <a:p>
             <a:pPr marL="742950" lvl="1" indent="-285750">
@@ -9361,16 +9449,9 @@
               <a:buChar char="•"/>
             </a:pPr>
             <a:r>
-              <a:rPr lang="en-GB" sz="1400" dirty="0"/>
-              <a:t>Highlights which topics most influence legislative success</a:t>
-            </a:r>
-          </a:p>
-          <a:p>
-            <a:r>
-              <a:rPr lang="en-GB" sz="1400" b="1" dirty="0"/>
-              <a:t>Drawing conclusions based on predictors:</a:t>
-            </a:r>
-            <a:endParaRPr lang="en-GB" sz="1400" dirty="0"/>
+              <a:rPr lang="en-GB" sz="1000" dirty="0"/>
+              <a:t>Logistic Regression</a:t>
+            </a:r>
           </a:p>
           <a:p>
             <a:pPr marL="742950" lvl="1" indent="-285750">
@@ -9378,8 +9459,8 @@
               <a:buChar char="•"/>
             </a:pPr>
             <a:r>
-              <a:rPr lang="en-GB" sz="1400" dirty="0"/>
-              <a:t>What are the predictors of bill survival?</a:t>
+              <a:rPr lang="en-GB" sz="1000" dirty="0"/>
+              <a:t>Dependent Variable: Bill survival  (Binary)</a:t>
             </a:r>
           </a:p>
           <a:p>
@@ -9388,8 +9469,8 @@
               <a:buChar char="•"/>
             </a:pPr>
             <a:r>
-              <a:rPr lang="en-GB" sz="1400" dirty="0"/>
-              <a:t>What are the main topics of AI legislature?</a:t>
+              <a:rPr lang="en-GB" sz="1000" dirty="0"/>
+              <a:t>Includes Authority-fixed-effects and interactions between Authorities and Topics</a:t>
             </a:r>
           </a:p>
           <a:p>
@@ -9397,27 +9478,13 @@
               <a:buFont typeface="Arial" panose="020B0604020202020204" pitchFamily="34" charset="0"/>
               <a:buChar char="•"/>
             </a:pPr>
-            <a:r>
-              <a:rPr lang="en-GB" sz="1400" dirty="0"/>
-              <a:t>Where are most topics discussed?</a:t>
-            </a:r>
-          </a:p>
-          <a:p>
-            <a:pPr marL="742950" lvl="1" indent="-285750">
-              <a:buFont typeface="Arial" panose="020B0604020202020204" pitchFamily="34" charset="0"/>
-              <a:buChar char="•"/>
+            <a:endParaRPr lang="en-GB" sz="1000" dirty="0"/>
+          </a:p>
+          <a:p>
+            <a:pPr marL="457200" lvl="1" indent="0">
+              <a:buNone/>
             </a:pPr>
-            <a:r>
-              <a:rPr lang="en-GB" sz="1400" dirty="0"/>
-              <a:t>Etc…</a:t>
-            </a:r>
-          </a:p>
-          <a:p>
-            <a:pPr marL="742950" lvl="1" indent="-285750">
-              <a:buFont typeface="Arial" panose="020B0604020202020204" pitchFamily="34" charset="0"/>
-              <a:buChar char="•"/>
-            </a:pPr>
-            <a:endParaRPr lang="en-GB" sz="1400" dirty="0"/>
+            <a:endParaRPr lang="en-GB" sz="1000" dirty="0"/>
           </a:p>
         </p:txBody>
       </p:sp>
@@ -9444,7 +9511,7 @@
           <a:p>
             <a:fld id="{5FA21818-B1F9-4DD3-88F2-43FBC3C9BAF5}" type="datetime1">
               <a:rPr lang="de-CH" noProof="0" smtClean="0"/>
-              <a:t>24.05.2025</a:t>
+              <a:t>29.05.2025</a:t>
             </a:fld>
             <a:endParaRPr lang="de-CH" noProof="0"/>
           </a:p>
@@ -10110,7 +10177,7 @@
           <a:p>
             <a:fld id="{298B387B-FBD3-42F8-9E31-B45335F65718}" type="datetime1">
               <a:rPr lang="de-CH" noProof="0" smtClean="0"/>
-              <a:t>24.05.2025</a:t>
+              <a:t>29.05.2025</a:t>
             </a:fld>
             <a:endParaRPr lang="de-CH" noProof="0"/>
           </a:p>
@@ -10327,7 +10394,7 @@
           <a:p>
             <a:fld id="{298B387B-FBD3-42F8-9E31-B45335F65718}" type="datetime1">
               <a:rPr lang="de-CH" noProof="0" smtClean="0"/>
-              <a:t>24.05.2025</a:t>
+              <a:t>29.05.2025</a:t>
             </a:fld>
             <a:endParaRPr lang="de-CH" noProof="0"/>
           </a:p>
@@ -10631,7 +10698,7 @@
           <a:p>
             <a:fld id="{298B387B-FBD3-42F8-9E31-B45335F65718}" type="datetime1">
               <a:rPr lang="de-CH" noProof="0" smtClean="0"/>
-              <a:t>24.05.2025</a:t>
+              <a:t>29.05.2025</a:t>
             </a:fld>
             <a:endParaRPr lang="de-CH" noProof="0"/>
           </a:p>

</xml_diff>